<commit_message>
Visual Studio Integration und Macros
</commit_message>
<xml_diff>
--- a/Clojure Vortrag .NET User Group.pptx
+++ b/Clojure Vortrag .NET User Group.pptx
@@ -5,7 +5,7 @@
     <p:sldMasterId id="2147483660" r:id="rId1"/>
   </p:sldMasterIdLst>
   <p:handoutMasterIdLst>
-    <p:handoutMasterId r:id="rId38"/>
+    <p:handoutMasterId r:id="rId41"/>
   </p:handoutMasterIdLst>
   <p:sldIdLst>
     <p:sldId id="256" r:id="rId2"/>
@@ -42,8 +42,11 @@
     <p:sldId id="294" r:id="rId33"/>
     <p:sldId id="296" r:id="rId34"/>
     <p:sldId id="297" r:id="rId35"/>
-    <p:sldId id="266" r:id="rId36"/>
-    <p:sldId id="261" r:id="rId37"/>
+    <p:sldId id="298" r:id="rId36"/>
+    <p:sldId id="299" r:id="rId37"/>
+    <p:sldId id="300" r:id="rId38"/>
+    <p:sldId id="266" r:id="rId39"/>
+    <p:sldId id="261" r:id="rId40"/>
   </p:sldIdLst>
   <p:sldSz cx="9144000" cy="6858000" type="screen4x3"/>
   <p:notesSz cx="6794500" cy="9931400"/>
@@ -227,7 +230,7 @@
           <a:p>
             <a:fld id="{58A9EE8F-FFE1-47DD-9EB3-5670B774654C}" type="datetimeFigureOut">
               <a:rPr lang="de-DE" smtClean="0"/>
-              <a:t>23.09.2013</a:t>
+              <a:t>24.09.2013</a:t>
             </a:fld>
             <a:endParaRPr lang="de-DE"/>
           </a:p>
@@ -499,7 +502,7 @@
           <a:p>
             <a:fld id="{ED9750E0-CE15-4EC1-B1D0-C2B3694DFCFC}" type="datetimeFigureOut">
               <a:rPr lang="de-DE" smtClean="0"/>
-              <a:t>23.09.2013</a:t>
+              <a:t>24.09.2013</a:t>
             </a:fld>
             <a:endParaRPr lang="de-DE"/>
           </a:p>
@@ -676,7 +679,7 @@
           <a:p>
             <a:fld id="{ED9750E0-CE15-4EC1-B1D0-C2B3694DFCFC}" type="datetimeFigureOut">
               <a:rPr lang="de-DE" smtClean="0"/>
-              <a:t>23.09.2013</a:t>
+              <a:t>24.09.2013</a:t>
             </a:fld>
             <a:endParaRPr lang="de-DE"/>
           </a:p>
@@ -874,7 +877,7 @@
           <a:p>
             <a:fld id="{ED9750E0-CE15-4EC1-B1D0-C2B3694DFCFC}" type="datetimeFigureOut">
               <a:rPr lang="de-DE" smtClean="0"/>
-              <a:t>23.09.2013</a:t>
+              <a:t>24.09.2013</a:t>
             </a:fld>
             <a:endParaRPr lang="de-DE"/>
           </a:p>
@@ -1028,7 +1031,7 @@
           <a:p>
             <a:fld id="{ED9750E0-CE15-4EC1-B1D0-C2B3694DFCFC}" type="datetimeFigureOut">
               <a:rPr lang="de-DE" smtClean="0"/>
-              <a:t>23.09.2013</a:t>
+              <a:t>24.09.2013</a:t>
             </a:fld>
             <a:endParaRPr lang="de-DE"/>
           </a:p>
@@ -1303,7 +1306,7 @@
           <a:p>
             <a:fld id="{ED9750E0-CE15-4EC1-B1D0-C2B3694DFCFC}" type="datetimeFigureOut">
               <a:rPr lang="de-DE" smtClean="0"/>
-              <a:t>23.09.2013</a:t>
+              <a:t>24.09.2013</a:t>
             </a:fld>
             <a:endParaRPr lang="de-DE"/>
           </a:p>
@@ -1602,7 +1605,7 @@
           <a:p>
             <a:fld id="{ED9750E0-CE15-4EC1-B1D0-C2B3694DFCFC}" type="datetimeFigureOut">
               <a:rPr lang="de-DE" smtClean="0"/>
-              <a:t>23.09.2013</a:t>
+              <a:t>24.09.2013</a:t>
             </a:fld>
             <a:endParaRPr lang="de-DE"/>
           </a:p>
@@ -2044,7 +2047,7 @@
           <a:p>
             <a:fld id="{ED9750E0-CE15-4EC1-B1D0-C2B3694DFCFC}" type="datetimeFigureOut">
               <a:rPr lang="de-DE" smtClean="0"/>
-              <a:t>23.09.2013</a:t>
+              <a:t>24.09.2013</a:t>
             </a:fld>
             <a:endParaRPr lang="de-DE"/>
           </a:p>
@@ -2151,7 +2154,7 @@
           <a:p>
             <a:fld id="{ED9750E0-CE15-4EC1-B1D0-C2B3694DFCFC}" type="datetimeFigureOut">
               <a:rPr lang="de-DE" smtClean="0"/>
-              <a:t>23.09.2013</a:t>
+              <a:t>24.09.2013</a:t>
             </a:fld>
             <a:endParaRPr lang="de-DE"/>
           </a:p>
@@ -2271,7 +2274,7 @@
           <a:p>
             <a:fld id="{ED9750E0-CE15-4EC1-B1D0-C2B3694DFCFC}" type="datetimeFigureOut">
               <a:rPr lang="de-DE" smtClean="0"/>
-              <a:t>23.09.2013</a:t>
+              <a:t>24.09.2013</a:t>
             </a:fld>
             <a:endParaRPr lang="de-DE"/>
           </a:p>
@@ -2556,7 +2559,7 @@
           <a:p>
             <a:fld id="{ED9750E0-CE15-4EC1-B1D0-C2B3694DFCFC}" type="datetimeFigureOut">
               <a:rPr lang="de-DE" smtClean="0"/>
-              <a:t>23.09.2013</a:t>
+              <a:t>24.09.2013</a:t>
             </a:fld>
             <a:endParaRPr lang="de-DE"/>
           </a:p>
@@ -2827,7 +2830,7 @@
           <a:p>
             <a:fld id="{ED9750E0-CE15-4EC1-B1D0-C2B3694DFCFC}" type="datetimeFigureOut">
               <a:rPr lang="de-DE" smtClean="0"/>
-              <a:t>23.09.2013</a:t>
+              <a:t>24.09.2013</a:t>
             </a:fld>
             <a:endParaRPr lang="de-DE"/>
           </a:p>
@@ -3047,7 +3050,7 @@
           <a:p>
             <a:fld id="{ED9750E0-CE15-4EC1-B1D0-C2B3694DFCFC}" type="datetimeFigureOut">
               <a:rPr lang="de-DE" smtClean="0"/>
-              <a:t>23.09.2013</a:t>
+              <a:t>24.09.2013</a:t>
             </a:fld>
             <a:endParaRPr lang="de-DE"/>
           </a:p>
@@ -4153,6 +4156,13 @@
   <p:clrMapOvr>
     <a:masterClrMapping/>
   </p:clrMapOvr>
+  <p:timing>
+    <p:tnLst>
+      <p:par>
+        <p:cTn id="1" dur="indefinite" restart="never" nodeType="tmRoot"/>
+      </p:par>
+    </p:tnLst>
+  </p:timing>
 </p:sld>
 </file>
 
@@ -13155,6 +13165,13 @@
   <p:clrMapOvr>
     <a:masterClrMapping/>
   </p:clrMapOvr>
+  <p:timing>
+    <p:tnLst>
+      <p:par>
+        <p:cTn id="1" dur="indefinite" restart="never" nodeType="tmRoot"/>
+      </p:par>
+    </p:tnLst>
+  </p:timing>
 </p:sld>
 </file>
 
@@ -13316,6 +13333,13 @@
   <p:clrMapOvr>
     <a:masterClrMapping/>
   </p:clrMapOvr>
+  <p:timing>
+    <p:tnLst>
+      <p:par>
+        <p:cTn id="1" dur="indefinite" restart="never" nodeType="tmRoot"/>
+      </p:par>
+    </p:tnLst>
+  </p:timing>
 </p:sld>
 </file>
 
@@ -13338,6 +13362,813 @@
       </p:grpSpPr>
       <p:sp>
         <p:nvSpPr>
+          <p:cNvPr id="4" name="TextBox 3"/>
+          <p:cNvSpPr txBox="1"/>
+          <p:nvPr/>
+        </p:nvSpPr>
+        <p:spPr>
+          <a:xfrm>
+            <a:off x="173676" y="3804400"/>
+            <a:ext cx="3174188" cy="1200329"/>
+          </a:xfrm>
+          <a:prstGeom prst="rect">
+            <a:avLst/>
+          </a:prstGeom>
+          <a:noFill/>
+        </p:spPr>
+        <p:txBody>
+          <a:bodyPr wrap="square" rtlCol="0">
+            <a:spAutoFit/>
+          </a:bodyPr>
+          <a:lstStyle/>
+          <a:p>
+            <a:r>
+              <a:rPr lang="de-DE" dirty="0" smtClean="0"/>
+              <a:t>Gut für schnelle Test</a:t>
+            </a:r>
+          </a:p>
+          <a:p>
+            <a:endParaRPr lang="de-DE" dirty="0" smtClean="0"/>
+          </a:p>
+          <a:p>
+            <a:r>
+              <a:rPr lang="de-DE" dirty="0" smtClean="0"/>
+              <a:t>Braucht einen zusätzlichen Editor zum Arbeiten</a:t>
+            </a:r>
+            <a:endParaRPr lang="de-DE" dirty="0"/>
+          </a:p>
+        </p:txBody>
+      </p:sp>
+      <p:pic>
+        <p:nvPicPr>
+          <p:cNvPr id="1026" name="Picture 2"/>
+          <p:cNvPicPr>
+            <a:picLocks noChangeAspect="1" noChangeArrowheads="1"/>
+          </p:cNvPicPr>
+          <p:nvPr/>
+        </p:nvPicPr>
+        <p:blipFill>
+          <a:blip r:embed="rId2">
+            <a:extLst>
+              <a:ext uri="{28A0092B-C50C-407E-A947-70E740481C1C}">
+                <a14:useLocalDpi xmlns:a14="http://schemas.microsoft.com/office/drawing/2010/main" val="0"/>
+              </a:ext>
+            </a:extLst>
+          </a:blip>
+          <a:srcRect/>
+          <a:stretch>
+            <a:fillRect/>
+          </a:stretch>
+        </p:blipFill>
+        <p:spPr bwMode="auto">
+          <a:xfrm>
+            <a:off x="5040295" y="2092332"/>
+            <a:ext cx="3788507" cy="1359853"/>
+          </a:xfrm>
+          <a:prstGeom prst="rect">
+            <a:avLst/>
+          </a:prstGeom>
+          <a:noFill/>
+          <a:ln>
+            <a:noFill/>
+          </a:ln>
+          <a:effectLst/>
+          <a:extLst>
+            <a:ext uri="{909E8E84-426E-40DD-AFC4-6F175D3DCCD1}">
+              <a14:hiddenFill xmlns:a14="http://schemas.microsoft.com/office/drawing/2010/main">
+                <a:solidFill>
+                  <a:schemeClr val="accent1"/>
+                </a:solidFill>
+              </a14:hiddenFill>
+            </a:ext>
+            <a:ext uri="{91240B29-F687-4F45-9708-019B960494DF}">
+              <a14:hiddenLine xmlns:a14="http://schemas.microsoft.com/office/drawing/2010/main" w="9525">
+                <a:solidFill>
+                  <a:schemeClr val="tx1"/>
+                </a:solidFill>
+                <a:miter lim="800000"/>
+                <a:headEnd/>
+                <a:tailEnd/>
+              </a14:hiddenLine>
+            </a:ext>
+            <a:ext uri="{AF507438-7753-43E0-B8FC-AC1667EBCBE1}">
+              <a14:hiddenEffects xmlns:a14="http://schemas.microsoft.com/office/drawing/2010/main">
+                <a:effectLst>
+                  <a:outerShdw dist="35921" dir="2700000" algn="ctr" rotWithShape="0">
+                    <a:schemeClr val="bg2"/>
+                  </a:outerShdw>
+                </a:effectLst>
+              </a14:hiddenEffects>
+            </a:ext>
+          </a:extLst>
+        </p:spPr>
+      </p:pic>
+      <p:sp>
+        <p:nvSpPr>
+          <p:cNvPr id="5" name="TextBox 4"/>
+          <p:cNvSpPr txBox="1"/>
+          <p:nvPr/>
+        </p:nvSpPr>
+        <p:spPr>
+          <a:xfrm>
+            <a:off x="3131840" y="620688"/>
+            <a:ext cx="2195463" cy="369332"/>
+          </a:xfrm>
+          <a:prstGeom prst="rect">
+            <a:avLst/>
+          </a:prstGeom>
+          <a:noFill/>
+        </p:spPr>
+        <p:txBody>
+          <a:bodyPr wrap="square" rtlCol="0">
+            <a:spAutoFit/>
+          </a:bodyPr>
+          <a:lstStyle/>
+          <a:p>
+            <a:r>
+              <a:rPr lang="de-DE" dirty="0" smtClean="0"/>
+              <a:t>Arbeiten mit </a:t>
+            </a:r>
+            <a:r>
+              <a:rPr lang="de-DE" dirty="0" err="1" smtClean="0"/>
+              <a:t>Clojure</a:t>
+            </a:r>
+            <a:endParaRPr lang="de-DE" dirty="0"/>
+          </a:p>
+        </p:txBody>
+      </p:sp>
+      <p:sp>
+        <p:nvSpPr>
+          <p:cNvPr id="6" name="TextBox 5"/>
+          <p:cNvSpPr txBox="1"/>
+          <p:nvPr/>
+        </p:nvSpPr>
+        <p:spPr>
+          <a:xfrm>
+            <a:off x="1403648" y="1628800"/>
+            <a:ext cx="1126886" cy="369332"/>
+          </a:xfrm>
+          <a:prstGeom prst="rect">
+            <a:avLst/>
+          </a:prstGeom>
+          <a:noFill/>
+        </p:spPr>
+        <p:txBody>
+          <a:bodyPr wrap="square" rtlCol="0">
+            <a:spAutoFit/>
+          </a:bodyPr>
+          <a:lstStyle/>
+          <a:p>
+            <a:r>
+              <a:rPr lang="de-DE" dirty="0" smtClean="0"/>
+              <a:t>Bare </a:t>
+            </a:r>
+            <a:r>
+              <a:rPr lang="de-DE" dirty="0" err="1" smtClean="0"/>
+              <a:t>Repl</a:t>
+            </a:r>
+            <a:endParaRPr lang="de-DE" dirty="0" smtClean="0"/>
+          </a:p>
+        </p:txBody>
+      </p:sp>
+      <p:pic>
+        <p:nvPicPr>
+          <p:cNvPr id="1027" name="Picture 3"/>
+          <p:cNvPicPr>
+            <a:picLocks noChangeAspect="1" noChangeArrowheads="1"/>
+          </p:cNvPicPr>
+          <p:nvPr/>
+        </p:nvPicPr>
+        <p:blipFill>
+          <a:blip r:embed="rId3">
+            <a:extLst>
+              <a:ext uri="{28A0092B-C50C-407E-A947-70E740481C1C}">
+                <a14:useLocalDpi xmlns:a14="http://schemas.microsoft.com/office/drawing/2010/main" val="0"/>
+              </a:ext>
+            </a:extLst>
+          </a:blip>
+          <a:srcRect/>
+          <a:stretch>
+            <a:fillRect/>
+          </a:stretch>
+        </p:blipFill>
+        <p:spPr bwMode="auto">
+          <a:xfrm>
+            <a:off x="150596" y="2169875"/>
+            <a:ext cx="3197268" cy="1394842"/>
+          </a:xfrm>
+          <a:prstGeom prst="rect">
+            <a:avLst/>
+          </a:prstGeom>
+          <a:noFill/>
+          <a:ln>
+            <a:noFill/>
+          </a:ln>
+          <a:effectLst/>
+          <a:extLst>
+            <a:ext uri="{909E8E84-426E-40DD-AFC4-6F175D3DCCD1}">
+              <a14:hiddenFill xmlns:a14="http://schemas.microsoft.com/office/drawing/2010/main">
+                <a:solidFill>
+                  <a:schemeClr val="accent1"/>
+                </a:solidFill>
+              </a14:hiddenFill>
+            </a:ext>
+            <a:ext uri="{91240B29-F687-4F45-9708-019B960494DF}">
+              <a14:hiddenLine xmlns:a14="http://schemas.microsoft.com/office/drawing/2010/main" w="9525">
+                <a:solidFill>
+                  <a:schemeClr val="tx1"/>
+                </a:solidFill>
+                <a:miter lim="800000"/>
+                <a:headEnd/>
+                <a:tailEnd/>
+              </a14:hiddenLine>
+            </a:ext>
+            <a:ext uri="{AF507438-7753-43E0-B8FC-AC1667EBCBE1}">
+              <a14:hiddenEffects xmlns:a14="http://schemas.microsoft.com/office/drawing/2010/main">
+                <a:effectLst>
+                  <a:outerShdw dist="35921" dir="2700000" algn="ctr" rotWithShape="0">
+                    <a:schemeClr val="bg2"/>
+                  </a:outerShdw>
+                </a:effectLst>
+              </a14:hiddenEffects>
+            </a:ext>
+          </a:extLst>
+        </p:spPr>
+      </p:pic>
+      <p:sp>
+        <p:nvSpPr>
+          <p:cNvPr id="9" name="TextBox 8"/>
+          <p:cNvSpPr txBox="1"/>
+          <p:nvPr/>
+        </p:nvSpPr>
+        <p:spPr>
+          <a:xfrm>
+            <a:off x="5364088" y="1551821"/>
+            <a:ext cx="2664296" cy="369332"/>
+          </a:xfrm>
+          <a:prstGeom prst="rect">
+            <a:avLst/>
+          </a:prstGeom>
+          <a:noFill/>
+        </p:spPr>
+        <p:txBody>
+          <a:bodyPr wrap="square" rtlCol="0">
+            <a:spAutoFit/>
+          </a:bodyPr>
+          <a:lstStyle/>
+          <a:p>
+            <a:r>
+              <a:rPr lang="de-DE" dirty="0" smtClean="0"/>
+              <a:t>Visual Studio Integration</a:t>
+            </a:r>
+          </a:p>
+        </p:txBody>
+      </p:sp>
+      <p:sp>
+        <p:nvSpPr>
+          <p:cNvPr id="10" name="TextBox 9"/>
+          <p:cNvSpPr txBox="1"/>
+          <p:nvPr/>
+        </p:nvSpPr>
+        <p:spPr>
+          <a:xfrm>
+            <a:off x="5109142" y="3988963"/>
+            <a:ext cx="3639322" cy="1477328"/>
+          </a:xfrm>
+          <a:prstGeom prst="rect">
+            <a:avLst/>
+          </a:prstGeom>
+          <a:noFill/>
+        </p:spPr>
+        <p:txBody>
+          <a:bodyPr wrap="square" rtlCol="0">
+            <a:spAutoFit/>
+          </a:bodyPr>
+          <a:lstStyle/>
+          <a:p>
+            <a:r>
+              <a:rPr lang="de-DE" dirty="0" smtClean="0"/>
+              <a:t>Besser für größere Projekte</a:t>
+            </a:r>
+          </a:p>
+          <a:p>
+            <a:endParaRPr lang="de-DE" dirty="0" smtClean="0"/>
+          </a:p>
+          <a:p>
+            <a:r>
+              <a:rPr lang="de-DE" dirty="0" smtClean="0"/>
+              <a:t>Hat integrierte REPL </a:t>
+            </a:r>
+          </a:p>
+          <a:p>
+            <a:r>
+              <a:rPr lang="de-DE" dirty="0" smtClean="0"/>
+              <a:t>Hat Projekt Support</a:t>
+            </a:r>
+          </a:p>
+          <a:p>
+            <a:r>
+              <a:rPr lang="de-DE" dirty="0" smtClean="0"/>
+              <a:t>Hat File Support</a:t>
+            </a:r>
+            <a:endParaRPr lang="de-DE" dirty="0"/>
+          </a:p>
+        </p:txBody>
+      </p:sp>
+      <p:sp>
+        <p:nvSpPr>
+          <p:cNvPr id="11" name="Down Arrow 10"/>
+          <p:cNvSpPr/>
+          <p:nvPr/>
+        </p:nvSpPr>
+        <p:spPr>
+          <a:xfrm rot="3382499">
+            <a:off x="2501476" y="869297"/>
+            <a:ext cx="360040" cy="842239"/>
+          </a:xfrm>
+          <a:prstGeom prst="downArrow">
+            <a:avLst>
+              <a:gd name="adj1" fmla="val 31465"/>
+              <a:gd name="adj2" fmla="val 50000"/>
+            </a:avLst>
+          </a:prstGeom>
+        </p:spPr>
+        <p:style>
+          <a:lnRef idx="2">
+            <a:schemeClr val="accent1">
+              <a:shade val="50000"/>
+            </a:schemeClr>
+          </a:lnRef>
+          <a:fillRef idx="1">
+            <a:schemeClr val="accent1"/>
+          </a:fillRef>
+          <a:effectRef idx="0">
+            <a:schemeClr val="accent1"/>
+          </a:effectRef>
+          <a:fontRef idx="minor">
+            <a:schemeClr val="lt1"/>
+          </a:fontRef>
+        </p:style>
+        <p:txBody>
+          <a:bodyPr rtlCol="0" anchor="ctr"/>
+          <a:lstStyle/>
+          <a:p>
+            <a:pPr algn="ctr"/>
+            <a:endParaRPr lang="de-DE"/>
+          </a:p>
+        </p:txBody>
+      </p:sp>
+      <p:sp>
+        <p:nvSpPr>
+          <p:cNvPr id="14" name="Down Arrow 13"/>
+          <p:cNvSpPr/>
+          <p:nvPr/>
+        </p:nvSpPr>
+        <p:spPr>
+          <a:xfrm rot="18136343">
+            <a:off x="5471376" y="794912"/>
+            <a:ext cx="360040" cy="827851"/>
+          </a:xfrm>
+          <a:prstGeom prst="downArrow">
+            <a:avLst>
+              <a:gd name="adj1" fmla="val 31465"/>
+              <a:gd name="adj2" fmla="val 50000"/>
+            </a:avLst>
+          </a:prstGeom>
+        </p:spPr>
+        <p:style>
+          <a:lnRef idx="2">
+            <a:schemeClr val="accent1">
+              <a:shade val="50000"/>
+            </a:schemeClr>
+          </a:lnRef>
+          <a:fillRef idx="1">
+            <a:schemeClr val="accent1"/>
+          </a:fillRef>
+          <a:effectRef idx="0">
+            <a:schemeClr val="accent1"/>
+          </a:effectRef>
+          <a:fontRef idx="minor">
+            <a:schemeClr val="lt1"/>
+          </a:fontRef>
+        </p:style>
+        <p:txBody>
+          <a:bodyPr rtlCol="0" anchor="ctr"/>
+          <a:lstStyle/>
+          <a:p>
+            <a:pPr algn="ctr"/>
+            <a:endParaRPr lang="de-DE"/>
+          </a:p>
+        </p:txBody>
+      </p:sp>
+    </p:spTree>
+    <p:extLst>
+      <p:ext uri="{BB962C8B-B14F-4D97-AF65-F5344CB8AC3E}">
+        <p14:creationId xmlns:p14="http://schemas.microsoft.com/office/powerpoint/2010/main" val="450818121"/>
+      </p:ext>
+    </p:extLst>
+  </p:cSld>
+  <p:clrMapOvr>
+    <a:masterClrMapping/>
+  </p:clrMapOvr>
+</p:sld>
+</file>
+
+<file path=ppt/slides/slide36.xml><?xml version="1.0" encoding="utf-8"?>
+<p:sld xmlns:a="http://schemas.openxmlformats.org/drawingml/2006/main" xmlns:r="http://schemas.openxmlformats.org/officeDocument/2006/relationships" xmlns:p="http://schemas.openxmlformats.org/presentationml/2006/main">
+  <p:cSld>
+    <p:spTree>
+      <p:nvGrpSpPr>
+        <p:cNvPr id="1" name=""/>
+        <p:cNvGrpSpPr/>
+        <p:nvPr/>
+      </p:nvGrpSpPr>
+      <p:grpSpPr>
+        <a:xfrm>
+          <a:off x="0" y="0"/>
+          <a:ext cx="0" cy="0"/>
+          <a:chOff x="0" y="0"/>
+          <a:chExt cx="0" cy="0"/>
+        </a:xfrm>
+      </p:grpSpPr>
+      <p:sp>
+        <p:nvSpPr>
+          <p:cNvPr id="4" name="TextBox 3"/>
+          <p:cNvSpPr txBox="1"/>
+          <p:nvPr/>
+        </p:nvSpPr>
+        <p:spPr>
+          <a:xfrm>
+            <a:off x="683568" y="692696"/>
+            <a:ext cx="4248472" cy="369332"/>
+          </a:xfrm>
+          <a:prstGeom prst="rect">
+            <a:avLst/>
+          </a:prstGeom>
+          <a:noFill/>
+        </p:spPr>
+        <p:txBody>
+          <a:bodyPr wrap="square" rtlCol="0">
+            <a:spAutoFit/>
+          </a:bodyPr>
+          <a:lstStyle/>
+          <a:p>
+            <a:r>
+              <a:rPr lang="de-DE" dirty="0" err="1" smtClean="0"/>
+              <a:t>Macrosystem</a:t>
+            </a:r>
+            <a:r>
+              <a:rPr lang="de-DE" dirty="0" smtClean="0"/>
+              <a:t> in </a:t>
+            </a:r>
+            <a:r>
+              <a:rPr lang="de-DE" dirty="0" err="1" smtClean="0"/>
+              <a:t>Clojure</a:t>
+            </a:r>
+            <a:endParaRPr lang="de-DE" dirty="0"/>
+          </a:p>
+        </p:txBody>
+      </p:sp>
+      <p:sp>
+        <p:nvSpPr>
+          <p:cNvPr id="5" name="TextBox 4"/>
+          <p:cNvSpPr txBox="1"/>
+          <p:nvPr/>
+        </p:nvSpPr>
+        <p:spPr>
+          <a:xfrm>
+            <a:off x="755576" y="3093028"/>
+            <a:ext cx="7704856" cy="4247317"/>
+          </a:xfrm>
+          <a:prstGeom prst="rect">
+            <a:avLst/>
+          </a:prstGeom>
+          <a:noFill/>
+        </p:spPr>
+        <p:txBody>
+          <a:bodyPr wrap="square" rtlCol="0">
+            <a:spAutoFit/>
+          </a:bodyPr>
+          <a:lstStyle/>
+          <a:p>
+            <a:r>
+              <a:rPr lang="de-DE" dirty="0" smtClean="0"/>
+              <a:t>Bestehende </a:t>
+            </a:r>
+            <a:r>
+              <a:rPr lang="de-DE" dirty="0" err="1" smtClean="0"/>
+              <a:t>Macros</a:t>
+            </a:r>
+            <a:r>
+              <a:rPr lang="de-DE" dirty="0" smtClean="0"/>
+              <a:t> anschauen</a:t>
+            </a:r>
+          </a:p>
+          <a:p>
+            <a:endParaRPr lang="de-DE" dirty="0"/>
+          </a:p>
+          <a:p>
+            <a:r>
+              <a:rPr lang="de-DE" dirty="0" smtClean="0"/>
+              <a:t>Um bestehende Makros anschauen zu können brauchen wir die Funktion</a:t>
+            </a:r>
+          </a:p>
+          <a:p>
+            <a:pPr marL="285750" indent="-285750">
+              <a:buFont typeface="Arial" pitchFamily="34" charset="0"/>
+              <a:buChar char="•"/>
+            </a:pPr>
+            <a:r>
+              <a:rPr lang="de-DE" dirty="0" err="1"/>
+              <a:t>m</a:t>
+            </a:r>
+            <a:r>
+              <a:rPr lang="de-DE" dirty="0" err="1" smtClean="0"/>
+              <a:t>acroexpand</a:t>
+            </a:r>
+            <a:endParaRPr lang="de-DE" dirty="0" smtClean="0"/>
+          </a:p>
+          <a:p>
+            <a:pPr marL="285750" indent="-285750">
+              <a:buFont typeface="Arial" pitchFamily="34" charset="0"/>
+              <a:buChar char="•"/>
+            </a:pPr>
+            <a:r>
+              <a:rPr lang="de-DE" dirty="0" smtClean="0"/>
+              <a:t> macroexpand-1</a:t>
+            </a:r>
+          </a:p>
+          <a:p>
+            <a:pPr marL="285750" indent="-285750">
+              <a:buFont typeface="Arial" pitchFamily="34" charset="0"/>
+              <a:buChar char="•"/>
+            </a:pPr>
+            <a:r>
+              <a:rPr lang="de-DE" dirty="0" err="1"/>
+              <a:t>m</a:t>
+            </a:r>
+            <a:r>
+              <a:rPr lang="de-DE" dirty="0" err="1" smtClean="0"/>
+              <a:t>acroexpand</a:t>
+            </a:r>
+            <a:r>
+              <a:rPr lang="de-DE" dirty="0" smtClean="0"/>
+              <a:t>-all	; (</a:t>
+            </a:r>
+            <a:r>
+              <a:rPr lang="de-DE" dirty="0" err="1" smtClean="0"/>
+              <a:t>use</a:t>
+            </a:r>
+            <a:r>
+              <a:rPr lang="de-DE" dirty="0" smtClean="0"/>
+              <a:t> ‘</a:t>
+            </a:r>
+            <a:r>
+              <a:rPr lang="de-DE" dirty="0" err="1" smtClean="0"/>
+              <a:t>clojure.walk</a:t>
+            </a:r>
+            <a:r>
+              <a:rPr lang="de-DE" dirty="0" smtClean="0"/>
+              <a:t>)</a:t>
+            </a:r>
+          </a:p>
+          <a:p>
+            <a:pPr marL="285750" indent="-285750">
+              <a:buFont typeface="Arial" pitchFamily="34" charset="0"/>
+              <a:buChar char="•"/>
+            </a:pPr>
+            <a:endParaRPr lang="de-DE" dirty="0"/>
+          </a:p>
+          <a:p>
+            <a:r>
+              <a:rPr lang="de-DE" dirty="0" smtClean="0"/>
+              <a:t>Beispiel:</a:t>
+            </a:r>
+          </a:p>
+          <a:p>
+            <a:endParaRPr lang="de-DE" dirty="0"/>
+          </a:p>
+          <a:p>
+            <a:r>
+              <a:rPr lang="de-DE" dirty="0" smtClean="0"/>
+              <a:t>In </a:t>
+            </a:r>
+            <a:r>
+              <a:rPr lang="de-DE" dirty="0" err="1" smtClean="0"/>
+              <a:t>clojure</a:t>
+            </a:r>
+            <a:r>
+              <a:rPr lang="de-DE" dirty="0" smtClean="0"/>
+              <a:t> gibt es bestehende </a:t>
+            </a:r>
+            <a:r>
+              <a:rPr lang="de-DE" dirty="0" err="1" smtClean="0"/>
+              <a:t>Macros</a:t>
+            </a:r>
+            <a:r>
+              <a:rPr lang="de-DE" dirty="0" smtClean="0"/>
+              <a:t>, wie …</a:t>
+            </a:r>
+          </a:p>
+          <a:p>
+            <a:r>
+              <a:rPr lang="de-DE" dirty="0" err="1" smtClean="0"/>
+              <a:t>defn</a:t>
+            </a:r>
+            <a:r>
+              <a:rPr lang="de-DE" dirty="0" smtClean="0"/>
+              <a:t> </a:t>
+            </a:r>
+          </a:p>
+          <a:p>
+            <a:r>
+              <a:rPr lang="de-DE" dirty="0" smtClean="0"/>
+              <a:t>time</a:t>
+            </a:r>
+          </a:p>
+          <a:p>
+            <a:r>
+              <a:rPr lang="de-DE" dirty="0" err="1" smtClean="0"/>
+              <a:t>and</a:t>
+            </a:r>
+            <a:endParaRPr lang="de-DE" dirty="0" smtClean="0"/>
+          </a:p>
+          <a:p>
+            <a:endParaRPr lang="de-DE" dirty="0" smtClean="0"/>
+          </a:p>
+          <a:p>
+            <a:endParaRPr lang="de-DE" dirty="0"/>
+          </a:p>
+        </p:txBody>
+      </p:sp>
+      <p:pic>
+        <p:nvPicPr>
+          <p:cNvPr id="2051" name="Picture 3"/>
+          <p:cNvPicPr>
+            <a:picLocks noChangeAspect="1" noChangeArrowheads="1"/>
+          </p:cNvPicPr>
+          <p:nvPr/>
+        </p:nvPicPr>
+        <p:blipFill>
+          <a:blip r:embed="rId2">
+            <a:extLst>
+              <a:ext uri="{28A0092B-C50C-407E-A947-70E740481C1C}">
+                <a14:useLocalDpi xmlns:a14="http://schemas.microsoft.com/office/drawing/2010/main" val="0"/>
+              </a:ext>
+            </a:extLst>
+          </a:blip>
+          <a:srcRect/>
+          <a:stretch>
+            <a:fillRect/>
+          </a:stretch>
+        </p:blipFill>
+        <p:spPr bwMode="auto">
+          <a:xfrm>
+            <a:off x="791337" y="1196752"/>
+            <a:ext cx="4343400" cy="1409700"/>
+          </a:xfrm>
+          <a:prstGeom prst="rect">
+            <a:avLst/>
+          </a:prstGeom>
+          <a:noFill/>
+          <a:ln>
+            <a:noFill/>
+          </a:ln>
+          <a:effectLst/>
+          <a:extLst>
+            <a:ext uri="{909E8E84-426E-40DD-AFC4-6F175D3DCCD1}">
+              <a14:hiddenFill xmlns:a14="http://schemas.microsoft.com/office/drawing/2010/main">
+                <a:solidFill>
+                  <a:schemeClr val="accent1"/>
+                </a:solidFill>
+              </a14:hiddenFill>
+            </a:ext>
+            <a:ext uri="{91240B29-F687-4F45-9708-019B960494DF}">
+              <a14:hiddenLine xmlns:a14="http://schemas.microsoft.com/office/drawing/2010/main" w="9525">
+                <a:solidFill>
+                  <a:schemeClr val="tx1"/>
+                </a:solidFill>
+                <a:miter lim="800000"/>
+                <a:headEnd/>
+                <a:tailEnd/>
+              </a14:hiddenLine>
+            </a:ext>
+            <a:ext uri="{AF507438-7753-43E0-B8FC-AC1667EBCBE1}">
+              <a14:hiddenEffects xmlns:a14="http://schemas.microsoft.com/office/drawing/2010/main">
+                <a:effectLst>
+                  <a:outerShdw dist="35921" dir="2700000" algn="ctr" rotWithShape="0">
+                    <a:schemeClr val="bg2"/>
+                  </a:outerShdw>
+                </a:effectLst>
+              </a14:hiddenEffects>
+            </a:ext>
+          </a:extLst>
+        </p:spPr>
+      </p:pic>
+    </p:spTree>
+    <p:extLst>
+      <p:ext uri="{BB962C8B-B14F-4D97-AF65-F5344CB8AC3E}">
+        <p14:creationId xmlns:p14="http://schemas.microsoft.com/office/powerpoint/2010/main" val="2883116586"/>
+      </p:ext>
+    </p:extLst>
+  </p:cSld>
+  <p:clrMapOvr>
+    <a:masterClrMapping/>
+  </p:clrMapOvr>
+</p:sld>
+</file>
+
+<file path=ppt/slides/slide37.xml><?xml version="1.0" encoding="utf-8"?>
+<p:sld xmlns:a="http://schemas.openxmlformats.org/drawingml/2006/main" xmlns:r="http://schemas.openxmlformats.org/officeDocument/2006/relationships" xmlns:p="http://schemas.openxmlformats.org/presentationml/2006/main">
+  <p:cSld>
+    <p:spTree>
+      <p:nvGrpSpPr>
+        <p:cNvPr id="1" name=""/>
+        <p:cNvGrpSpPr/>
+        <p:nvPr/>
+      </p:nvGrpSpPr>
+      <p:grpSpPr>
+        <a:xfrm>
+          <a:off x="0" y="0"/>
+          <a:ext cx="0" cy="0"/>
+          <a:chOff x="0" y="0"/>
+          <a:chExt cx="0" cy="0"/>
+        </a:xfrm>
+      </p:grpSpPr>
+      <p:sp>
+        <p:nvSpPr>
+          <p:cNvPr id="4" name="TextBox 3"/>
+          <p:cNvSpPr txBox="1"/>
+          <p:nvPr/>
+        </p:nvSpPr>
+        <p:spPr>
+          <a:xfrm>
+            <a:off x="395536" y="692696"/>
+            <a:ext cx="5688632" cy="369332"/>
+          </a:xfrm>
+          <a:prstGeom prst="rect">
+            <a:avLst/>
+          </a:prstGeom>
+          <a:noFill/>
+        </p:spPr>
+        <p:txBody>
+          <a:bodyPr wrap="square" rtlCol="0">
+            <a:spAutoFit/>
+          </a:bodyPr>
+          <a:lstStyle/>
+          <a:p>
+            <a:r>
+              <a:rPr lang="de-DE" dirty="0" err="1" smtClean="0"/>
+              <a:t>Macros</a:t>
+            </a:r>
+            <a:r>
+              <a:rPr lang="de-DE" dirty="0" smtClean="0"/>
+              <a:t> werden in einen gesonderten </a:t>
+            </a:r>
+            <a:r>
+              <a:rPr lang="de-DE" dirty="0" err="1" smtClean="0"/>
+              <a:t>zyklus</a:t>
+            </a:r>
+            <a:r>
+              <a:rPr lang="de-DE" dirty="0" smtClean="0"/>
+              <a:t> ausgelesen</a:t>
+            </a:r>
+            <a:endParaRPr lang="de-DE" dirty="0"/>
+          </a:p>
+        </p:txBody>
+      </p:sp>
+    </p:spTree>
+    <p:extLst>
+      <p:ext uri="{BB962C8B-B14F-4D97-AF65-F5344CB8AC3E}">
+        <p14:creationId xmlns:p14="http://schemas.microsoft.com/office/powerpoint/2010/main" val="2601248588"/>
+      </p:ext>
+    </p:extLst>
+  </p:cSld>
+  <p:clrMapOvr>
+    <a:masterClrMapping/>
+  </p:clrMapOvr>
+</p:sld>
+</file>
+
+<file path=ppt/slides/slide38.xml><?xml version="1.0" encoding="utf-8"?>
+<p:sld xmlns:a="http://schemas.openxmlformats.org/drawingml/2006/main" xmlns:r="http://schemas.openxmlformats.org/officeDocument/2006/relationships" xmlns:p="http://schemas.openxmlformats.org/presentationml/2006/main">
+  <p:cSld>
+    <p:spTree>
+      <p:nvGrpSpPr>
+        <p:cNvPr id="1" name=""/>
+        <p:cNvGrpSpPr/>
+        <p:nvPr/>
+      </p:nvGrpSpPr>
+      <p:grpSpPr>
+        <a:xfrm>
+          <a:off x="0" y="0"/>
+          <a:ext cx="0" cy="0"/>
+          <a:chOff x="0" y="0"/>
+          <a:chExt cx="0" cy="0"/>
+        </a:xfrm>
+      </p:grpSpPr>
+      <p:sp>
+        <p:nvSpPr>
           <p:cNvPr id="4" name="Textfeld 3"/>
           <p:cNvSpPr txBox="1"/>
           <p:nvPr/>
@@ -13490,7 +14321,7 @@
 </p:sld>
 </file>
 
-<file path=ppt/slides/slide36.xml><?xml version="1.0" encoding="utf-8"?>
+<file path=ppt/slides/slide39.xml><?xml version="1.0" encoding="utf-8"?>
 <p:sld xmlns:a="http://schemas.openxmlformats.org/drawingml/2006/main" xmlns:r="http://schemas.openxmlformats.org/officeDocument/2006/relationships" xmlns:p="http://schemas.openxmlformats.org/presentationml/2006/main">
   <p:cSld>
     <p:spTree>

</xml_diff>

<commit_message>
New slides regarding macros
</commit_message>
<xml_diff>
--- a/Clojure Vortrag .NET User Group.pptx
+++ b/Clojure Vortrag .NET User Group.pptx
@@ -5,7 +5,7 @@
     <p:sldMasterId id="2147483660" r:id="rId1"/>
   </p:sldMasterIdLst>
   <p:handoutMasterIdLst>
-    <p:handoutMasterId r:id="rId43"/>
+    <p:handoutMasterId r:id="rId46"/>
   </p:handoutMasterIdLst>
   <p:sldIdLst>
     <p:sldId id="256" r:id="rId2"/>
@@ -46,9 +46,12 @@
     <p:sldId id="299" r:id="rId37"/>
     <p:sldId id="300" r:id="rId38"/>
     <p:sldId id="301" r:id="rId39"/>
-    <p:sldId id="302" r:id="rId40"/>
-    <p:sldId id="303" r:id="rId41"/>
-    <p:sldId id="266" r:id="rId42"/>
+    <p:sldId id="305" r:id="rId40"/>
+    <p:sldId id="306" r:id="rId41"/>
+    <p:sldId id="302" r:id="rId42"/>
+    <p:sldId id="303" r:id="rId43"/>
+    <p:sldId id="304" r:id="rId44"/>
+    <p:sldId id="266" r:id="rId45"/>
   </p:sldIdLst>
   <p:sldSz cx="9144000" cy="6858000" type="screen4x3"/>
   <p:notesSz cx="6794500" cy="9931400"/>
@@ -232,7 +235,7 @@
           <a:p>
             <a:fld id="{58A9EE8F-FFE1-47DD-9EB3-5670B774654C}" type="datetimeFigureOut">
               <a:rPr lang="de-DE" smtClean="0"/>
-              <a:t>25.09.2013</a:t>
+              <a:t>26.09.2013</a:t>
             </a:fld>
             <a:endParaRPr lang="de-DE"/>
           </a:p>
@@ -504,7 +507,7 @@
           <a:p>
             <a:fld id="{ED9750E0-CE15-4EC1-B1D0-C2B3694DFCFC}" type="datetimeFigureOut">
               <a:rPr lang="de-DE" smtClean="0"/>
-              <a:t>25.09.2013</a:t>
+              <a:t>26.09.2013</a:t>
             </a:fld>
             <a:endParaRPr lang="de-DE"/>
           </a:p>
@@ -681,7 +684,7 @@
           <a:p>
             <a:fld id="{ED9750E0-CE15-4EC1-B1D0-C2B3694DFCFC}" type="datetimeFigureOut">
               <a:rPr lang="de-DE" smtClean="0"/>
-              <a:t>25.09.2013</a:t>
+              <a:t>26.09.2013</a:t>
             </a:fld>
             <a:endParaRPr lang="de-DE"/>
           </a:p>
@@ -879,7 +882,7 @@
           <a:p>
             <a:fld id="{ED9750E0-CE15-4EC1-B1D0-C2B3694DFCFC}" type="datetimeFigureOut">
               <a:rPr lang="de-DE" smtClean="0"/>
-              <a:t>25.09.2013</a:t>
+              <a:t>26.09.2013</a:t>
             </a:fld>
             <a:endParaRPr lang="de-DE"/>
           </a:p>
@@ -1033,7 +1036,7 @@
           <a:p>
             <a:fld id="{ED9750E0-CE15-4EC1-B1D0-C2B3694DFCFC}" type="datetimeFigureOut">
               <a:rPr lang="de-DE" smtClean="0"/>
-              <a:t>25.09.2013</a:t>
+              <a:t>26.09.2013</a:t>
             </a:fld>
             <a:endParaRPr lang="de-DE"/>
           </a:p>
@@ -1308,7 +1311,7 @@
           <a:p>
             <a:fld id="{ED9750E0-CE15-4EC1-B1D0-C2B3694DFCFC}" type="datetimeFigureOut">
               <a:rPr lang="de-DE" smtClean="0"/>
-              <a:t>25.09.2013</a:t>
+              <a:t>26.09.2013</a:t>
             </a:fld>
             <a:endParaRPr lang="de-DE"/>
           </a:p>
@@ -1607,7 +1610,7 @@
           <a:p>
             <a:fld id="{ED9750E0-CE15-4EC1-B1D0-C2B3694DFCFC}" type="datetimeFigureOut">
               <a:rPr lang="de-DE" smtClean="0"/>
-              <a:t>25.09.2013</a:t>
+              <a:t>26.09.2013</a:t>
             </a:fld>
             <a:endParaRPr lang="de-DE"/>
           </a:p>
@@ -2049,7 +2052,7 @@
           <a:p>
             <a:fld id="{ED9750E0-CE15-4EC1-B1D0-C2B3694DFCFC}" type="datetimeFigureOut">
               <a:rPr lang="de-DE" smtClean="0"/>
-              <a:t>25.09.2013</a:t>
+              <a:t>26.09.2013</a:t>
             </a:fld>
             <a:endParaRPr lang="de-DE"/>
           </a:p>
@@ -2156,7 +2159,7 @@
           <a:p>
             <a:fld id="{ED9750E0-CE15-4EC1-B1D0-C2B3694DFCFC}" type="datetimeFigureOut">
               <a:rPr lang="de-DE" smtClean="0"/>
-              <a:t>25.09.2013</a:t>
+              <a:t>26.09.2013</a:t>
             </a:fld>
             <a:endParaRPr lang="de-DE"/>
           </a:p>
@@ -2276,7 +2279,7 @@
           <a:p>
             <a:fld id="{ED9750E0-CE15-4EC1-B1D0-C2B3694DFCFC}" type="datetimeFigureOut">
               <a:rPr lang="de-DE" smtClean="0"/>
-              <a:t>25.09.2013</a:t>
+              <a:t>26.09.2013</a:t>
             </a:fld>
             <a:endParaRPr lang="de-DE"/>
           </a:p>
@@ -2561,7 +2564,7 @@
           <a:p>
             <a:fld id="{ED9750E0-CE15-4EC1-B1D0-C2B3694DFCFC}" type="datetimeFigureOut">
               <a:rPr lang="de-DE" smtClean="0"/>
-              <a:t>25.09.2013</a:t>
+              <a:t>26.09.2013</a:t>
             </a:fld>
             <a:endParaRPr lang="de-DE"/>
           </a:p>
@@ -2832,7 +2835,7 @@
           <a:p>
             <a:fld id="{ED9750E0-CE15-4EC1-B1D0-C2B3694DFCFC}" type="datetimeFigureOut">
               <a:rPr lang="de-DE" smtClean="0"/>
-              <a:t>25.09.2013</a:t>
+              <a:t>26.09.2013</a:t>
             </a:fld>
             <a:endParaRPr lang="de-DE"/>
           </a:p>
@@ -3052,7 +3055,7 @@
           <a:p>
             <a:fld id="{ED9750E0-CE15-4EC1-B1D0-C2B3694DFCFC}" type="datetimeFigureOut">
               <a:rPr lang="de-DE" smtClean="0"/>
-              <a:t>25.09.2013</a:t>
+              <a:t>26.09.2013</a:t>
             </a:fld>
             <a:endParaRPr lang="de-DE"/>
           </a:p>
@@ -13773,6 +13776,13 @@
   <p:clrMapOvr>
     <a:masterClrMapping/>
   </p:clrMapOvr>
+  <p:timing>
+    <p:tnLst>
+      <p:par>
+        <p:cTn id="1" dur="indefinite" restart="never" nodeType="tmRoot"/>
+      </p:par>
+    </p:tnLst>
+  </p:timing>
 </p:sld>
 </file>
 
@@ -13840,7 +13850,7 @@
         <p:spPr>
           <a:xfrm>
             <a:off x="755576" y="3093028"/>
-            <a:ext cx="7704856" cy="4247317"/>
+            <a:ext cx="7704856" cy="3970318"/>
           </a:xfrm>
           <a:prstGeom prst="rect">
             <a:avLst/>
@@ -13881,24 +13891,10 @@
               <a:buChar char="•"/>
             </a:pPr>
             <a:r>
-              <a:rPr lang="de-DE" dirty="0" err="1"/>
-              <a:t>m</a:t>
-            </a:r>
-            <a:r>
-              <a:rPr lang="de-DE" dirty="0" err="1" smtClean="0"/>
-              <a:t>acroexpand</a:t>
+              <a:rPr lang="de-DE" dirty="0" err="1" smtClean="0"/>
+              <a:t>macroexpand</a:t>
             </a:r>
             <a:endParaRPr lang="de-DE" dirty="0" smtClean="0"/>
-          </a:p>
-          <a:p>
-            <a:pPr marL="285750" indent="-285750">
-              <a:buFont typeface="Arial" pitchFamily="34" charset="0"/>
-              <a:buChar char="•"/>
-            </a:pPr>
-            <a:r>
-              <a:rPr lang="de-DE" dirty="0" smtClean="0"/>
-              <a:t> macroexpand-1</a:t>
-            </a:r>
           </a:p>
           <a:p>
             <a:pPr marL="285750" indent="-285750">
@@ -14077,6 +14073,13 @@
   <p:clrMapOvr>
     <a:masterClrMapping/>
   </p:clrMapOvr>
+  <p:timing>
+    <p:tnLst>
+      <p:par>
+        <p:cTn id="1" dur="indefinite" restart="never" nodeType="tmRoot"/>
+      </p:par>
+    </p:tnLst>
+  </p:timing>
 </p:sld>
 </file>
 
@@ -14258,6 +14261,13 @@
   <p:clrMapOvr>
     <a:masterClrMapping/>
   </p:clrMapOvr>
+  <p:timing>
+    <p:tnLst>
+      <p:par>
+        <p:cTn id="1" dur="indefinite" restart="never" nodeType="tmRoot"/>
+      </p:par>
+    </p:tnLst>
+  </p:timing>
 </p:sld>
 </file>
 
@@ -14681,6 +14691,13 @@
   <p:clrMapOvr>
     <a:masterClrMapping/>
   </p:clrMapOvr>
+  <p:timing>
+    <p:tnLst>
+      <p:par>
+        <p:cTn id="1" dur="indefinite" restart="never" nodeType="tmRoot"/>
+      </p:par>
+    </p:tnLst>
+  </p:timing>
 </p:sld>
 </file>
 
@@ -14703,14 +14720,14 @@
       </p:grpSpPr>
       <p:sp>
         <p:nvSpPr>
-          <p:cNvPr id="4" name="Textfeld 3"/>
+          <p:cNvPr id="4" name="TextBox 3"/>
           <p:cNvSpPr txBox="1"/>
           <p:nvPr/>
         </p:nvSpPr>
         <p:spPr>
           <a:xfrm>
-            <a:off x="755576" y="764704"/>
-            <a:ext cx="4104456" cy="2031325"/>
+            <a:off x="395536" y="476672"/>
+            <a:ext cx="8208912" cy="5355312"/>
           </a:xfrm>
           <a:prstGeom prst="rect">
             <a:avLst/>
@@ -14725,65 +14742,211 @@
           <a:p>
             <a:r>
               <a:rPr lang="de-DE" dirty="0" smtClean="0"/>
-              <a:t>Beispiel Applikationen in Visual Studio</a:t>
-            </a:r>
-          </a:p>
-          <a:p>
-            <a:endParaRPr lang="de-DE" dirty="0"/>
-          </a:p>
-          <a:p>
-            <a:r>
-              <a:rPr lang="de-DE" dirty="0" smtClean="0"/>
-              <a:t>Game </a:t>
-            </a:r>
-            <a:r>
-              <a:rPr lang="de-DE" dirty="0" err="1" smtClean="0"/>
-              <a:t>of</a:t>
-            </a:r>
-            <a:r>
-              <a:rPr lang="de-DE" dirty="0" smtClean="0"/>
-              <a:t> Life</a:t>
-            </a:r>
-          </a:p>
-          <a:p>
-            <a:endParaRPr lang="de-DE" dirty="0"/>
-          </a:p>
-          <a:p>
-            <a:r>
-              <a:rPr lang="de-DE" dirty="0" smtClean="0"/>
-              <a:t>Word Shuffle</a:t>
-            </a:r>
-          </a:p>
-          <a:p>
-            <a:endParaRPr lang="de-DE" dirty="0"/>
-          </a:p>
-          <a:p>
-            <a:r>
-              <a:rPr lang="de-DE" dirty="0" smtClean="0"/>
-              <a:t>Daten </a:t>
-            </a:r>
-            <a:r>
-              <a:rPr lang="de-DE" dirty="0" err="1" smtClean="0"/>
-              <a:t>crunchen</a:t>
-            </a:r>
-            <a:r>
-              <a:rPr lang="de-DE" dirty="0" smtClean="0"/>
-              <a:t> File und Datenbank</a:t>
-            </a:r>
-            <a:endParaRPr lang="de-DE" dirty="0"/>
+              <a:t>Schreiben eines eigenen Makros</a:t>
+            </a:r>
+          </a:p>
+          <a:p>
+            <a:endParaRPr lang="de-DE" dirty="0" smtClean="0"/>
+          </a:p>
+          <a:p>
+            <a:r>
+              <a:rPr lang="de-DE" dirty="0" smtClean="0"/>
+              <a:t>(</a:t>
+            </a:r>
+            <a:r>
+              <a:rPr lang="de-DE" dirty="0" err="1"/>
+              <a:t>defmacro</a:t>
+            </a:r>
+            <a:r>
+              <a:rPr lang="de-DE" dirty="0"/>
+              <a:t> </a:t>
+            </a:r>
+            <a:r>
+              <a:rPr lang="de-DE" dirty="0" err="1"/>
+              <a:t>dbg</a:t>
+            </a:r>
+            <a:r>
+              <a:rPr lang="de-DE" dirty="0"/>
+              <a:t> [x] </a:t>
+            </a:r>
+          </a:p>
+          <a:p>
+            <a:r>
+              <a:rPr lang="nn-NO" dirty="0"/>
+              <a:t>  `(let [x# ~x] (println "dbg:" '~x "=" x#) x</a:t>
+            </a:r>
+            <a:r>
+              <a:rPr lang="nn-NO" dirty="0" smtClean="0"/>
+              <a:t>#))</a:t>
+            </a:r>
+          </a:p>
+          <a:p>
+            <a:endParaRPr lang="nn-NO" dirty="0" smtClean="0"/>
+          </a:p>
+          <a:p>
+            <a:r>
+              <a:rPr lang="nn-NO" dirty="0" smtClean="0"/>
+              <a:t>(dbg (* 2 </a:t>
+            </a:r>
+            <a:r>
+              <a:rPr lang="nn-NO" dirty="0"/>
+              <a:t>3))	; dbg: (+ 2 3) = 5</a:t>
+            </a:r>
+            <a:endParaRPr lang="nn-NO" dirty="0" smtClean="0"/>
+          </a:p>
+          <a:p>
+            <a:endParaRPr lang="nn-NO" dirty="0"/>
+          </a:p>
+          <a:p>
+            <a:pPr marL="285750" indent="-285750">
+              <a:buFont typeface="Arial" pitchFamily="34" charset="0"/>
+              <a:buChar char="•"/>
+            </a:pPr>
+            <a:r>
+              <a:rPr lang="nn-NO" dirty="0" smtClean="0"/>
+              <a:t>Macro heißt dbg</a:t>
+            </a:r>
+          </a:p>
+          <a:p>
+            <a:pPr marL="285750" indent="-285750">
+              <a:buFont typeface="Arial" pitchFamily="34" charset="0"/>
+              <a:buChar char="•"/>
+            </a:pPr>
+            <a:r>
+              <a:rPr lang="nn-NO" dirty="0" smtClean="0"/>
+              <a:t>Hat ein Parameter x    -&gt;   (* 2 3)</a:t>
+            </a:r>
+          </a:p>
+          <a:p>
+            <a:pPr marL="285750" indent="-285750">
+              <a:buFont typeface="Arial" pitchFamily="34" charset="0"/>
+              <a:buChar char="•"/>
+            </a:pPr>
+            <a:r>
+              <a:rPr lang="nn-NO" dirty="0" smtClean="0"/>
+              <a:t>Der Backtick leitet eine Schablone ein</a:t>
+            </a:r>
+          </a:p>
+          <a:p>
+            <a:pPr marL="285750" indent="-285750">
+              <a:buFont typeface="Arial" pitchFamily="34" charset="0"/>
+              <a:buChar char="•"/>
+            </a:pPr>
+            <a:r>
+              <a:rPr lang="nn-NO" dirty="0" smtClean="0"/>
+              <a:t>~x unterbricht die Schablone und setzt den Wert selber ein ~x    -&gt; 6</a:t>
+            </a:r>
+          </a:p>
+          <a:p>
+            <a:pPr marL="285750" indent="-285750">
+              <a:buFont typeface="Arial" pitchFamily="34" charset="0"/>
+              <a:buChar char="•"/>
+            </a:pPr>
+            <a:r>
+              <a:rPr lang="nn-NO" dirty="0" smtClean="0"/>
+              <a:t>x# erzeugt einen innerhalb des Macros eindeutigen Bezeichner. Macros können so geschachtelt werden. x#   </a:t>
+            </a:r>
+            <a:r>
+              <a:rPr lang="nn-NO" dirty="0"/>
+              <a:t>-&gt; </a:t>
+            </a:r>
+            <a:r>
+              <a:rPr lang="nn-NO" dirty="0" smtClean="0"/>
+              <a:t>x</a:t>
+            </a:r>
+            <a:r>
+              <a:rPr lang="nn-NO" dirty="0"/>
+              <a:t>__8__auto</a:t>
+            </a:r>
+            <a:r>
+              <a:rPr lang="nn-NO" dirty="0" smtClean="0"/>
+              <a:t>__   -&gt; 6</a:t>
+            </a:r>
+          </a:p>
+          <a:p>
+            <a:pPr marL="285750" indent="-285750">
+              <a:buFont typeface="Arial" pitchFamily="34" charset="0"/>
+              <a:buChar char="•"/>
+            </a:pPr>
+            <a:r>
+              <a:rPr lang="nn-NO" dirty="0"/>
+              <a:t>'~</a:t>
+            </a:r>
+            <a:r>
+              <a:rPr lang="nn-NO" dirty="0" smtClean="0"/>
+              <a:t>x setzt den Wert wieder selber ein, aber durch den Quote wir er nicht ausgewertet. </a:t>
+            </a:r>
+            <a:r>
+              <a:rPr lang="nn-NO" dirty="0"/>
+              <a:t>'~</a:t>
+            </a:r>
+            <a:r>
+              <a:rPr lang="nn-NO" dirty="0" smtClean="0"/>
+              <a:t>x -&gt; (* 2 3)</a:t>
+            </a:r>
+          </a:p>
+          <a:p>
+            <a:pPr marL="285750" indent="-285750">
+              <a:buFont typeface="Arial" pitchFamily="34" charset="0"/>
+              <a:buChar char="•"/>
+            </a:pPr>
+            <a:r>
+              <a:rPr lang="nn-NO" dirty="0"/>
+              <a:t>Das println </a:t>
+            </a:r>
+            <a:r>
+              <a:rPr lang="nn-NO" dirty="0" smtClean="0"/>
+              <a:t>gibt folgende aus -  &gt;      dbg:(+ </a:t>
+            </a:r>
+            <a:r>
+              <a:rPr lang="nn-NO" dirty="0"/>
+              <a:t>2 3) = </a:t>
+            </a:r>
+            <a:r>
+              <a:rPr lang="nn-NO" dirty="0" smtClean="0"/>
+              <a:t>5 </a:t>
+            </a:r>
+          </a:p>
+          <a:p>
+            <a:pPr marL="285750" indent="-285750">
+              <a:buFont typeface="Arial" pitchFamily="34" charset="0"/>
+              <a:buChar char="•"/>
+            </a:pPr>
+            <a:r>
+              <a:rPr lang="nn-NO" dirty="0" smtClean="0"/>
+              <a:t>Die lezte Anweisung des Makros ist x#    -&gt; 6</a:t>
+            </a:r>
+          </a:p>
+          <a:p>
+            <a:pPr marL="285750" indent="-285750">
+              <a:buFont typeface="Arial" pitchFamily="34" charset="0"/>
+              <a:buChar char="•"/>
+            </a:pPr>
+            <a:r>
+              <a:rPr lang="nn-NO" dirty="0" smtClean="0"/>
+              <a:t>Dieser Wert wird zurückgegeben. Das Makro erzeugt also nur den Seiteneffekt der Konsolen Ausgabe, beeinflußt das Programm aber nicht!</a:t>
+            </a:r>
+            <a:endParaRPr lang="de-DE" dirty="0" smtClean="0"/>
           </a:p>
         </p:txBody>
       </p:sp>
     </p:spTree>
     <p:extLst>
       <p:ext uri="{BB962C8B-B14F-4D97-AF65-F5344CB8AC3E}">
-        <p14:creationId xmlns:p14="http://schemas.microsoft.com/office/powerpoint/2010/main" val="573607304"/>
+        <p14:creationId xmlns:p14="http://schemas.microsoft.com/office/powerpoint/2010/main" val="3387688208"/>
       </p:ext>
     </p:extLst>
   </p:cSld>
   <p:clrMapOvr>
     <a:masterClrMapping/>
   </p:clrMapOvr>
+  <p:timing>
+    <p:tnLst>
+      <p:par>
+        <p:cTn id="1" dur="indefinite" restart="never" nodeType="tmRoot"/>
+      </p:par>
+    </p:tnLst>
+  </p:timing>
 </p:sld>
 </file>
 
@@ -15306,6 +15469,507 @@
           <a:chExt cx="0" cy="0"/>
         </a:xfrm>
       </p:grpSpPr>
+      <p:pic>
+        <p:nvPicPr>
+          <p:cNvPr id="1026" name="Picture 2"/>
+          <p:cNvPicPr>
+            <a:picLocks noChangeAspect="1" noChangeArrowheads="1"/>
+          </p:cNvPicPr>
+          <p:nvPr/>
+        </p:nvPicPr>
+        <p:blipFill>
+          <a:blip r:embed="rId2">
+            <a:extLst>
+              <a:ext uri="{28A0092B-C50C-407E-A947-70E740481C1C}">
+                <a14:useLocalDpi xmlns:a14="http://schemas.microsoft.com/office/drawing/2010/main" val="0"/>
+              </a:ext>
+            </a:extLst>
+          </a:blip>
+          <a:srcRect/>
+          <a:stretch>
+            <a:fillRect/>
+          </a:stretch>
+        </p:blipFill>
+        <p:spPr bwMode="auto">
+          <a:xfrm>
+            <a:off x="971599" y="3212976"/>
+            <a:ext cx="6181725" cy="2133600"/>
+          </a:xfrm>
+          <a:prstGeom prst="rect">
+            <a:avLst/>
+          </a:prstGeom>
+          <a:noFill/>
+          <a:ln>
+            <a:noFill/>
+          </a:ln>
+          <a:effectLst/>
+          <a:extLst>
+            <a:ext uri="{909E8E84-426E-40DD-AFC4-6F175D3DCCD1}">
+              <a14:hiddenFill xmlns:a14="http://schemas.microsoft.com/office/drawing/2010/main">
+                <a:solidFill>
+                  <a:schemeClr val="accent1"/>
+                </a:solidFill>
+              </a14:hiddenFill>
+            </a:ext>
+            <a:ext uri="{91240B29-F687-4F45-9708-019B960494DF}">
+              <a14:hiddenLine xmlns:a14="http://schemas.microsoft.com/office/drawing/2010/main" w="9525">
+                <a:solidFill>
+                  <a:schemeClr val="tx1"/>
+                </a:solidFill>
+                <a:miter lim="800000"/>
+                <a:headEnd/>
+                <a:tailEnd/>
+              </a14:hiddenLine>
+            </a:ext>
+            <a:ext uri="{AF507438-7753-43E0-B8FC-AC1667EBCBE1}">
+              <a14:hiddenEffects xmlns:a14="http://schemas.microsoft.com/office/drawing/2010/main">
+                <a:effectLst>
+                  <a:outerShdw dist="35921" dir="2700000" algn="ctr" rotWithShape="0">
+                    <a:schemeClr val="bg2"/>
+                  </a:outerShdw>
+                </a:effectLst>
+              </a14:hiddenEffects>
+            </a:ext>
+          </a:extLst>
+        </p:spPr>
+      </p:pic>
+      <p:sp>
+        <p:nvSpPr>
+          <p:cNvPr id="4" name="TextBox 3"/>
+          <p:cNvSpPr txBox="1"/>
+          <p:nvPr/>
+        </p:nvSpPr>
+        <p:spPr>
+          <a:xfrm>
+            <a:off x="323528" y="476672"/>
+            <a:ext cx="7920880" cy="1754326"/>
+          </a:xfrm>
+          <a:prstGeom prst="rect">
+            <a:avLst/>
+          </a:prstGeom>
+          <a:noFill/>
+        </p:spPr>
+        <p:txBody>
+          <a:bodyPr wrap="square" rtlCol="0">
+            <a:spAutoFit/>
+          </a:bodyPr>
+          <a:lstStyle/>
+          <a:p>
+            <a:r>
+              <a:rPr lang="de-DE" dirty="0" smtClean="0"/>
+              <a:t>Wo finde ich die </a:t>
+            </a:r>
+            <a:r>
+              <a:rPr lang="de-DE" dirty="0" err="1" smtClean="0"/>
+              <a:t>Macro</a:t>
+            </a:r>
+            <a:r>
+              <a:rPr lang="de-DE" dirty="0" smtClean="0"/>
+              <a:t> Zeichen auf meiner Tastatur</a:t>
+            </a:r>
+          </a:p>
+          <a:p>
+            <a:endParaRPr lang="de-DE" dirty="0"/>
+          </a:p>
+          <a:p>
+            <a:pPr marL="285750" indent="-285750">
+              <a:buFont typeface="Arial" pitchFamily="34" charset="0"/>
+              <a:buChar char="•"/>
+            </a:pPr>
+            <a:r>
+              <a:rPr lang="de-DE" dirty="0" err="1"/>
+              <a:t>q</a:t>
+            </a:r>
+            <a:r>
+              <a:rPr lang="de-DE" dirty="0" err="1" smtClean="0"/>
+              <a:t>uote</a:t>
+            </a:r>
+            <a:r>
+              <a:rPr lang="de-DE" dirty="0" smtClean="0"/>
+              <a:t>  ‘ 		-&gt;	Taste 1 mit </a:t>
+            </a:r>
+            <a:r>
+              <a:rPr lang="de-DE" dirty="0" err="1" smtClean="0"/>
+              <a:t>Shift</a:t>
+            </a:r>
+            <a:endParaRPr lang="de-DE" dirty="0" smtClean="0"/>
+          </a:p>
+          <a:p>
+            <a:pPr marL="285750" indent="-285750">
+              <a:buFont typeface="Arial" pitchFamily="34" charset="0"/>
+              <a:buChar char="•"/>
+            </a:pPr>
+            <a:r>
+              <a:rPr lang="de-DE" dirty="0" smtClean="0"/>
+              <a:t>syntax</a:t>
+            </a:r>
+            <a:r>
+              <a:rPr lang="de-DE" dirty="0"/>
+              <a:t>-</a:t>
+            </a:r>
+            <a:r>
+              <a:rPr lang="de-DE" dirty="0" err="1" smtClean="0"/>
+              <a:t>quoute</a:t>
+            </a:r>
+            <a:r>
+              <a:rPr lang="de-DE" dirty="0" smtClean="0"/>
+              <a:t> `		-&gt;	Taste 2 mit </a:t>
+            </a:r>
+            <a:r>
+              <a:rPr lang="de-DE" dirty="0" err="1" smtClean="0"/>
+              <a:t>Shift</a:t>
+            </a:r>
+            <a:endParaRPr lang="de-DE" dirty="0" smtClean="0"/>
+          </a:p>
+          <a:p>
+            <a:pPr marL="285750" indent="-285750">
+              <a:buFont typeface="Arial" pitchFamily="34" charset="0"/>
+              <a:buChar char="•"/>
+            </a:pPr>
+            <a:r>
+              <a:rPr lang="de-DE" dirty="0" smtClean="0"/>
+              <a:t> </a:t>
+            </a:r>
+            <a:r>
+              <a:rPr lang="de-DE" dirty="0" err="1" smtClean="0"/>
+              <a:t>unquoute</a:t>
+            </a:r>
+            <a:r>
+              <a:rPr lang="de-DE" dirty="0" smtClean="0"/>
+              <a:t> ~		-&gt;	Taste 3 mit </a:t>
+            </a:r>
+            <a:r>
+              <a:rPr lang="de-DE" dirty="0" err="1" smtClean="0"/>
+              <a:t>AltGr</a:t>
+            </a:r>
+            <a:endParaRPr lang="de-DE" dirty="0" smtClean="0"/>
+          </a:p>
+          <a:p>
+            <a:pPr marL="285750" indent="-285750">
+              <a:buFont typeface="Arial" pitchFamily="34" charset="0"/>
+              <a:buChar char="•"/>
+            </a:pPr>
+            <a:r>
+              <a:rPr lang="de-DE" dirty="0" err="1" smtClean="0"/>
+              <a:t>Unquote-splicing</a:t>
+            </a:r>
+            <a:r>
+              <a:rPr lang="de-DE" dirty="0" smtClean="0"/>
+              <a:t> ~@	-&gt;                </a:t>
+            </a:r>
+            <a:r>
+              <a:rPr lang="de-DE" dirty="0" err="1" smtClean="0"/>
+              <a:t>nocmal</a:t>
+            </a:r>
+            <a:r>
+              <a:rPr lang="de-DE" dirty="0" smtClean="0"/>
+              <a:t> </a:t>
+            </a:r>
+            <a:r>
+              <a:rPr lang="de-DE" dirty="0" err="1" smtClean="0"/>
+              <a:t>unquote</a:t>
+            </a:r>
+            <a:r>
+              <a:rPr lang="de-DE" dirty="0" smtClean="0"/>
+              <a:t> + @ Taste 4</a:t>
+            </a:r>
+          </a:p>
+        </p:txBody>
+      </p:sp>
+      <p:sp>
+        <p:nvSpPr>
+          <p:cNvPr id="8" name="TextBox 7"/>
+          <p:cNvSpPr txBox="1"/>
+          <p:nvPr/>
+        </p:nvSpPr>
+        <p:spPr>
+          <a:xfrm>
+            <a:off x="6384940" y="4095110"/>
+            <a:ext cx="265166" cy="369332"/>
+          </a:xfrm>
+          <a:prstGeom prst="rect">
+            <a:avLst/>
+          </a:prstGeom>
+          <a:noFill/>
+        </p:spPr>
+        <p:txBody>
+          <a:bodyPr wrap="square" rtlCol="0">
+            <a:spAutoFit/>
+          </a:bodyPr>
+          <a:lstStyle/>
+          <a:p>
+            <a:r>
+              <a:rPr lang="de-DE" dirty="0" smtClean="0">
+                <a:solidFill>
+                  <a:srgbClr val="FF0000"/>
+                </a:solidFill>
+              </a:rPr>
+              <a:t>1</a:t>
+            </a:r>
+            <a:endParaRPr lang="de-DE" dirty="0">
+              <a:solidFill>
+                <a:srgbClr val="FF0000"/>
+              </a:solidFill>
+            </a:endParaRPr>
+          </a:p>
+        </p:txBody>
+      </p:sp>
+      <p:sp>
+        <p:nvSpPr>
+          <p:cNvPr id="13" name="TextBox 12"/>
+          <p:cNvSpPr txBox="1"/>
+          <p:nvPr/>
+        </p:nvSpPr>
+        <p:spPr>
+          <a:xfrm>
+            <a:off x="6002205" y="3231818"/>
+            <a:ext cx="265166" cy="369332"/>
+          </a:xfrm>
+          <a:prstGeom prst="rect">
+            <a:avLst/>
+          </a:prstGeom>
+          <a:noFill/>
+        </p:spPr>
+        <p:txBody>
+          <a:bodyPr wrap="square" rtlCol="0">
+            <a:spAutoFit/>
+          </a:bodyPr>
+          <a:lstStyle/>
+          <a:p>
+            <a:r>
+              <a:rPr lang="de-DE" dirty="0">
+                <a:solidFill>
+                  <a:srgbClr val="FF0000"/>
+                </a:solidFill>
+              </a:rPr>
+              <a:t>2</a:t>
+            </a:r>
+            <a:endParaRPr lang="de-DE" dirty="0">
+              <a:solidFill>
+                <a:srgbClr val="FF0000"/>
+              </a:solidFill>
+            </a:endParaRPr>
+          </a:p>
+        </p:txBody>
+      </p:sp>
+      <p:sp>
+        <p:nvSpPr>
+          <p:cNvPr id="14" name="TextBox 13"/>
+          <p:cNvSpPr txBox="1"/>
+          <p:nvPr/>
+        </p:nvSpPr>
+        <p:spPr>
+          <a:xfrm>
+            <a:off x="6303174" y="3601150"/>
+            <a:ext cx="265166" cy="369332"/>
+          </a:xfrm>
+          <a:prstGeom prst="rect">
+            <a:avLst/>
+          </a:prstGeom>
+          <a:noFill/>
+        </p:spPr>
+        <p:txBody>
+          <a:bodyPr wrap="square" rtlCol="0">
+            <a:spAutoFit/>
+          </a:bodyPr>
+          <a:lstStyle/>
+          <a:p>
+            <a:r>
+              <a:rPr lang="de-DE" dirty="0" smtClean="0">
+                <a:solidFill>
+                  <a:srgbClr val="FF0000"/>
+                </a:solidFill>
+              </a:rPr>
+              <a:t>3</a:t>
+            </a:r>
+          </a:p>
+        </p:txBody>
+      </p:sp>
+      <p:sp>
+        <p:nvSpPr>
+          <p:cNvPr id="15" name="TextBox 14"/>
+          <p:cNvSpPr txBox="1"/>
+          <p:nvPr/>
+        </p:nvSpPr>
+        <p:spPr>
+          <a:xfrm>
+            <a:off x="1835696" y="3601150"/>
+            <a:ext cx="265166" cy="369332"/>
+          </a:xfrm>
+          <a:prstGeom prst="rect">
+            <a:avLst/>
+          </a:prstGeom>
+          <a:noFill/>
+        </p:spPr>
+        <p:txBody>
+          <a:bodyPr wrap="square" rtlCol="0">
+            <a:spAutoFit/>
+          </a:bodyPr>
+          <a:lstStyle/>
+          <a:p>
+            <a:r>
+              <a:rPr lang="de-DE" dirty="0">
+                <a:solidFill>
+                  <a:srgbClr val="FF0000"/>
+                </a:solidFill>
+              </a:rPr>
+              <a:t>4</a:t>
+            </a:r>
+            <a:endParaRPr lang="de-DE" dirty="0" smtClean="0">
+              <a:solidFill>
+                <a:srgbClr val="FF0000"/>
+              </a:solidFill>
+            </a:endParaRPr>
+          </a:p>
+        </p:txBody>
+      </p:sp>
+    </p:spTree>
+    <p:extLst>
+      <p:ext uri="{BB962C8B-B14F-4D97-AF65-F5344CB8AC3E}">
+        <p14:creationId xmlns:p14="http://schemas.microsoft.com/office/powerpoint/2010/main" val="28614900"/>
+      </p:ext>
+    </p:extLst>
+  </p:cSld>
+  <p:clrMapOvr>
+    <a:masterClrMapping/>
+  </p:clrMapOvr>
+  <p:timing>
+    <p:tnLst>
+      <p:par>
+        <p:cTn id="1" dur="indefinite" restart="never" nodeType="tmRoot"/>
+      </p:par>
+    </p:tnLst>
+  </p:timing>
+</p:sld>
+</file>
+
+<file path=ppt/slides/slide41.xml><?xml version="1.0" encoding="utf-8"?>
+<p:sld xmlns:a="http://schemas.openxmlformats.org/drawingml/2006/main" xmlns:r="http://schemas.openxmlformats.org/officeDocument/2006/relationships" xmlns:p="http://schemas.openxmlformats.org/presentationml/2006/main">
+  <p:cSld>
+    <p:spTree>
+      <p:nvGrpSpPr>
+        <p:cNvPr id="1" name=""/>
+        <p:cNvGrpSpPr/>
+        <p:nvPr/>
+      </p:nvGrpSpPr>
+      <p:grpSpPr>
+        <a:xfrm>
+          <a:off x="0" y="0"/>
+          <a:ext cx="0" cy="0"/>
+          <a:chOff x="0" y="0"/>
+          <a:chExt cx="0" cy="0"/>
+        </a:xfrm>
+      </p:grpSpPr>
+      <p:sp>
+        <p:nvSpPr>
+          <p:cNvPr id="4" name="Textfeld 3"/>
+          <p:cNvSpPr txBox="1"/>
+          <p:nvPr/>
+        </p:nvSpPr>
+        <p:spPr>
+          <a:xfrm>
+            <a:off x="755576" y="764704"/>
+            <a:ext cx="4104456" cy="2031325"/>
+          </a:xfrm>
+          <a:prstGeom prst="rect">
+            <a:avLst/>
+          </a:prstGeom>
+          <a:noFill/>
+        </p:spPr>
+        <p:txBody>
+          <a:bodyPr wrap="square" rtlCol="0">
+            <a:spAutoFit/>
+          </a:bodyPr>
+          <a:lstStyle/>
+          <a:p>
+            <a:r>
+              <a:rPr lang="de-DE" dirty="0" smtClean="0"/>
+              <a:t>Beispiel Applikationen in Visual Studio</a:t>
+            </a:r>
+          </a:p>
+          <a:p>
+            <a:endParaRPr lang="de-DE" dirty="0"/>
+          </a:p>
+          <a:p>
+            <a:r>
+              <a:rPr lang="de-DE" dirty="0" smtClean="0"/>
+              <a:t>Game </a:t>
+            </a:r>
+            <a:r>
+              <a:rPr lang="de-DE" dirty="0" err="1" smtClean="0"/>
+              <a:t>of</a:t>
+            </a:r>
+            <a:r>
+              <a:rPr lang="de-DE" dirty="0" smtClean="0"/>
+              <a:t> Life</a:t>
+            </a:r>
+          </a:p>
+          <a:p>
+            <a:endParaRPr lang="de-DE" dirty="0"/>
+          </a:p>
+          <a:p>
+            <a:r>
+              <a:rPr lang="de-DE" dirty="0" smtClean="0"/>
+              <a:t>Word Shuffle</a:t>
+            </a:r>
+          </a:p>
+          <a:p>
+            <a:endParaRPr lang="de-DE" dirty="0"/>
+          </a:p>
+          <a:p>
+            <a:r>
+              <a:rPr lang="de-DE" dirty="0" smtClean="0"/>
+              <a:t>Daten </a:t>
+            </a:r>
+            <a:r>
+              <a:rPr lang="de-DE" dirty="0" err="1" smtClean="0"/>
+              <a:t>crunchen</a:t>
+            </a:r>
+            <a:r>
+              <a:rPr lang="de-DE" dirty="0" smtClean="0"/>
+              <a:t> File und Datenbank</a:t>
+            </a:r>
+            <a:endParaRPr lang="de-DE" dirty="0"/>
+          </a:p>
+        </p:txBody>
+      </p:sp>
+    </p:spTree>
+    <p:extLst>
+      <p:ext uri="{BB962C8B-B14F-4D97-AF65-F5344CB8AC3E}">
+        <p14:creationId xmlns:p14="http://schemas.microsoft.com/office/powerpoint/2010/main" val="573607304"/>
+      </p:ext>
+    </p:extLst>
+  </p:cSld>
+  <p:clrMapOvr>
+    <a:masterClrMapping/>
+  </p:clrMapOvr>
+  <p:timing>
+    <p:tnLst>
+      <p:par>
+        <p:cTn id="1" dur="indefinite" restart="never" nodeType="tmRoot"/>
+      </p:par>
+    </p:tnLst>
+  </p:timing>
+</p:sld>
+</file>
+
+<file path=ppt/slides/slide42.xml><?xml version="1.0" encoding="utf-8"?>
+<p:sld xmlns:a="http://schemas.openxmlformats.org/drawingml/2006/main" xmlns:r="http://schemas.openxmlformats.org/officeDocument/2006/relationships" xmlns:p="http://schemas.openxmlformats.org/presentationml/2006/main">
+  <p:cSld>
+    <p:spTree>
+      <p:nvGrpSpPr>
+        <p:cNvPr id="1" name=""/>
+        <p:cNvGrpSpPr/>
+        <p:nvPr/>
+      </p:nvGrpSpPr>
+      <p:grpSpPr>
+        <a:xfrm>
+          <a:off x="0" y="0"/>
+          <a:ext cx="0" cy="0"/>
+          <a:chOff x="0" y="0"/>
+          <a:chExt cx="0" cy="0"/>
+        </a:xfrm>
+      </p:grpSpPr>
       <p:sp>
         <p:nvSpPr>
           <p:cNvPr id="4" name="Textfeld 3"/>
@@ -15368,10 +16032,268 @@
   <p:clrMapOvr>
     <a:masterClrMapping/>
   </p:clrMapOvr>
+  <p:timing>
+    <p:tnLst>
+      <p:par>
+        <p:cTn id="1" dur="indefinite" restart="never" nodeType="tmRoot"/>
+      </p:par>
+    </p:tnLst>
+  </p:timing>
 </p:sld>
 </file>
 
-<file path=ppt/slides/slide41.xml><?xml version="1.0" encoding="utf-8"?>
+<file path=ppt/slides/slide43.xml><?xml version="1.0" encoding="utf-8"?>
+<p:sld xmlns:a="http://schemas.openxmlformats.org/drawingml/2006/main" xmlns:r="http://schemas.openxmlformats.org/officeDocument/2006/relationships" xmlns:p="http://schemas.openxmlformats.org/presentationml/2006/main">
+  <p:cSld>
+    <p:spTree>
+      <p:nvGrpSpPr>
+        <p:cNvPr id="1" name=""/>
+        <p:cNvGrpSpPr/>
+        <p:nvPr/>
+      </p:nvGrpSpPr>
+      <p:grpSpPr>
+        <a:xfrm>
+          <a:off x="0" y="0"/>
+          <a:ext cx="0" cy="0"/>
+          <a:chOff x="0" y="0"/>
+          <a:chExt cx="0" cy="0"/>
+        </a:xfrm>
+      </p:grpSpPr>
+      <p:sp>
+        <p:nvSpPr>
+          <p:cNvPr id="4" name="TextBox 3"/>
+          <p:cNvSpPr txBox="1"/>
+          <p:nvPr/>
+        </p:nvSpPr>
+        <p:spPr>
+          <a:xfrm>
+            <a:off x="611560" y="548680"/>
+            <a:ext cx="4968552" cy="369332"/>
+          </a:xfrm>
+          <a:prstGeom prst="rect">
+            <a:avLst/>
+          </a:prstGeom>
+          <a:noFill/>
+        </p:spPr>
+        <p:txBody>
+          <a:bodyPr wrap="square" rtlCol="0">
+            <a:spAutoFit/>
+          </a:bodyPr>
+          <a:lstStyle/>
+          <a:p>
+            <a:r>
+              <a:rPr lang="de-DE" dirty="0" smtClean="0"/>
+              <a:t>Link und </a:t>
+            </a:r>
+            <a:r>
+              <a:rPr lang="de-DE" dirty="0" err="1" smtClean="0"/>
+              <a:t>Resourcen</a:t>
+            </a:r>
+            <a:r>
+              <a:rPr lang="de-DE" dirty="0" smtClean="0"/>
+              <a:t> Sammlung</a:t>
+            </a:r>
+            <a:endParaRPr lang="de-DE" dirty="0"/>
+          </a:p>
+        </p:txBody>
+      </p:sp>
+      <p:sp>
+        <p:nvSpPr>
+          <p:cNvPr id="5" name="TextBox 4"/>
+          <p:cNvSpPr txBox="1"/>
+          <p:nvPr/>
+        </p:nvSpPr>
+        <p:spPr>
+          <a:xfrm>
+            <a:off x="611560" y="1268760"/>
+            <a:ext cx="8136904" cy="5078313"/>
+          </a:xfrm>
+          <a:prstGeom prst="rect">
+            <a:avLst/>
+          </a:prstGeom>
+          <a:noFill/>
+        </p:spPr>
+        <p:txBody>
+          <a:bodyPr wrap="square" rtlCol="0">
+            <a:spAutoFit/>
+          </a:bodyPr>
+          <a:lstStyle/>
+          <a:p>
+            <a:r>
+              <a:rPr lang="de-DE" dirty="0" smtClean="0"/>
+              <a:t>Links</a:t>
+            </a:r>
+            <a:endParaRPr lang="de-DE" dirty="0">
+              <a:hlinkClick r:id="rId2"/>
+            </a:endParaRPr>
+          </a:p>
+          <a:p>
+            <a:r>
+              <a:rPr lang="de-DE" dirty="0" smtClean="0">
+                <a:hlinkClick r:id="rId2"/>
+              </a:rPr>
+              <a:t>http</a:t>
+            </a:r>
+            <a:r>
+              <a:rPr lang="de-DE" dirty="0">
+                <a:hlinkClick r:id="rId2"/>
+              </a:rPr>
+              <a:t>://clojure.org/</a:t>
+            </a:r>
+          </a:p>
+          <a:p>
+            <a:r>
+              <a:rPr lang="de-DE" dirty="0" smtClean="0">
+                <a:hlinkClick r:id="rId2"/>
+              </a:rPr>
+              <a:t>http</a:t>
+            </a:r>
+            <a:r>
+              <a:rPr lang="de-DE" dirty="0">
+                <a:hlinkClick r:id="rId2"/>
+              </a:rPr>
+              <a:t>://clojuredocs.org</a:t>
+            </a:r>
+            <a:r>
+              <a:rPr lang="de-DE" dirty="0" smtClean="0">
+                <a:hlinkClick r:id="rId2"/>
+              </a:rPr>
+              <a:t>/</a:t>
+            </a:r>
+            <a:endParaRPr lang="de-DE" dirty="0" smtClean="0"/>
+          </a:p>
+          <a:p>
+            <a:r>
+              <a:rPr lang="de-DE" dirty="0">
+                <a:hlinkClick r:id="rId3"/>
+              </a:rPr>
+              <a:t>https://</a:t>
+            </a:r>
+            <a:r>
+              <a:rPr lang="de-DE" dirty="0" smtClean="0">
+                <a:hlinkClick r:id="rId3"/>
+              </a:rPr>
+              <a:t>github.com/clojure/clojure-clr/wiki</a:t>
+            </a:r>
+            <a:endParaRPr lang="de-DE" dirty="0" smtClean="0"/>
+          </a:p>
+          <a:p>
+            <a:r>
+              <a:rPr lang="de-DE" dirty="0">
+                <a:hlinkClick r:id="rId4"/>
+              </a:rPr>
+              <a:t>http://planet.clojure.in</a:t>
+            </a:r>
+            <a:r>
+              <a:rPr lang="de-DE" dirty="0" smtClean="0">
+                <a:hlinkClick r:id="rId4"/>
+              </a:rPr>
+              <a:t>/</a:t>
+            </a:r>
+            <a:endParaRPr lang="de-DE" dirty="0" smtClean="0"/>
+          </a:p>
+          <a:p>
+            <a:endParaRPr lang="de-DE" dirty="0"/>
+          </a:p>
+          <a:p>
+            <a:r>
+              <a:rPr lang="de-DE" dirty="0" err="1" smtClean="0"/>
+              <a:t>Resourcen</a:t>
+            </a:r>
+            <a:endParaRPr lang="de-DE" dirty="0" smtClean="0"/>
+          </a:p>
+          <a:p>
+            <a:r>
+              <a:rPr lang="de-DE" dirty="0">
+                <a:hlinkClick r:id="rId5"/>
+              </a:rPr>
+              <a:t>https://github.com/thomasschulte</a:t>
+            </a:r>
+            <a:r>
+              <a:rPr lang="de-DE" dirty="0" smtClean="0">
+                <a:hlinkClick r:id="rId5"/>
+              </a:rPr>
+              <a:t>/</a:t>
+            </a:r>
+            <a:endParaRPr lang="de-DE" dirty="0" smtClean="0"/>
+          </a:p>
+          <a:p>
+            <a:endParaRPr lang="de-DE" dirty="0"/>
+          </a:p>
+          <a:p>
+            <a:r>
+              <a:rPr lang="de-DE" dirty="0" smtClean="0"/>
+              <a:t>Videos</a:t>
+            </a:r>
+          </a:p>
+          <a:p>
+            <a:r>
+              <a:rPr lang="de-DE" dirty="0">
+                <a:hlinkClick r:id="rId6"/>
+              </a:rPr>
+              <a:t>http://</a:t>
+            </a:r>
+            <a:r>
+              <a:rPr lang="de-DE" dirty="0" smtClean="0">
+                <a:hlinkClick r:id="rId6"/>
+              </a:rPr>
+              <a:t>www.infoq.com/presentations/Simple-Made-Easy</a:t>
+            </a:r>
+            <a:endParaRPr lang="de-DE" dirty="0" smtClean="0"/>
+          </a:p>
+          <a:p>
+            <a:r>
+              <a:rPr lang="de-DE" dirty="0">
+                <a:hlinkClick r:id="rId7"/>
+              </a:rPr>
+              <a:t>http://</a:t>
+            </a:r>
+            <a:r>
+              <a:rPr lang="de-DE" dirty="0" smtClean="0">
+                <a:hlinkClick r:id="rId7"/>
+              </a:rPr>
+              <a:t>channel9.msdn.com/Shows/Going+Deep/Expert-to-Expert-Rich-Hickey-and-Brian-Beckman-Inside-Clojure</a:t>
+            </a:r>
+            <a:endParaRPr lang="de-DE" dirty="0" smtClean="0"/>
+          </a:p>
+          <a:p>
+            <a:endParaRPr lang="de-DE" dirty="0"/>
+          </a:p>
+          <a:p>
+            <a:endParaRPr lang="de-DE" dirty="0" smtClean="0"/>
+          </a:p>
+          <a:p>
+            <a:endParaRPr lang="de-DE" dirty="0"/>
+          </a:p>
+          <a:p>
+            <a:endParaRPr lang="de-DE" dirty="0" smtClean="0"/>
+          </a:p>
+          <a:p>
+            <a:endParaRPr lang="de-DE" dirty="0"/>
+          </a:p>
+        </p:txBody>
+      </p:sp>
+    </p:spTree>
+    <p:extLst>
+      <p:ext uri="{BB962C8B-B14F-4D97-AF65-F5344CB8AC3E}">
+        <p14:creationId xmlns:p14="http://schemas.microsoft.com/office/powerpoint/2010/main" val="3411574074"/>
+      </p:ext>
+    </p:extLst>
+  </p:cSld>
+  <p:clrMapOvr>
+    <a:masterClrMapping/>
+  </p:clrMapOvr>
+  <p:timing>
+    <p:tnLst>
+      <p:par>
+        <p:cTn id="1" dur="indefinite" restart="never" nodeType="tmRoot"/>
+      </p:par>
+    </p:tnLst>
+  </p:timing>
+</p:sld>
+</file>
+
+<file path=ppt/slides/slide44.xml><?xml version="1.0" encoding="utf-8"?>
 <p:sld xmlns:a="http://schemas.openxmlformats.org/drawingml/2006/main" xmlns:r="http://schemas.openxmlformats.org/officeDocument/2006/relationships" xmlns:p="http://schemas.openxmlformats.org/presentationml/2006/main">
   <p:cSld>
     <p:spTree>

</xml_diff>